<commit_message>
remove class 1 demo
</commit_message>
<xml_diff>
--- a/buoi4+5_flutter/[4+5- Flutter] Flutter 2.pptx
+++ b/buoi4+5_flutter/[4+5- Flutter] Flutter 2.pptx
@@ -4539,7 +4539,7 @@
         <p:spPr>
           <a:xfrm>
             <a:off x="756138" y="1107831"/>
-            <a:ext cx="5345723" cy="2031325"/>
+            <a:ext cx="5345723" cy="2308324"/>
           </a:xfrm>
           <a:prstGeom prst="rect">
             <a:avLst/>
@@ -4588,6 +4588,21 @@
               <a:rPr lang="en-US" dirty="0"/>
               <a:t>:</a:t>
             </a:r>
+          </a:p>
+          <a:p>
+            <a:r>
+              <a:rPr lang="en-US" dirty="0">
+                <a:hlinkClick r:id="rId3"/>
+              </a:rPr>
+              <a:t>https://youtu.be</a:t>
+            </a:r>
+            <a:r>
+              <a:rPr lang="en-US">
+                <a:hlinkClick r:id="rId3"/>
+              </a:rPr>
+              <a:t>/9wRsr03LQrg</a:t>
+            </a:r>
+            <a:endParaRPr lang="en-US"/>
           </a:p>
           <a:p>
             <a:endParaRPr lang="en-US" dirty="0"/>

</xml_diff>